<commit_message>
update to logo pptx
</commit_message>
<xml_diff>
--- a/images/logo.pptx
+++ b/images/logo.pptx
@@ -6,6 +6,7 @@
   </p:sldMasterIdLst>
   <p:sldIdLst>
     <p:sldId id="256" r:id="rId2"/>
+    <p:sldId id="257" r:id="rId3"/>
   </p:sldIdLst>
   <p:sldSz cx="9144000" cy="6858000" type="screen4x3"/>
   <p:notesSz cx="6858000" cy="9144000"/>
@@ -288,7 +289,7 @@
           <a:p>
             <a:fld id="{FB5C35D8-3231-4754-9AE7-6DBAFD39FC18}" type="datetimeFigureOut">
               <a:rPr lang="en-GB" smtClean="0"/>
-              <a:t>13/03/2015</a:t>
+              <a:t>22/04/2015</a:t>
             </a:fld>
             <a:endParaRPr lang="en-GB" dirty="0"/>
           </a:p>
@@ -458,7 +459,7 @@
           <a:p>
             <a:fld id="{FB5C35D8-3231-4754-9AE7-6DBAFD39FC18}" type="datetimeFigureOut">
               <a:rPr lang="en-GB" smtClean="0"/>
-              <a:t>13/03/2015</a:t>
+              <a:t>22/04/2015</a:t>
             </a:fld>
             <a:endParaRPr lang="en-GB" dirty="0"/>
           </a:p>
@@ -638,7 +639,7 @@
           <a:p>
             <a:fld id="{FB5C35D8-3231-4754-9AE7-6DBAFD39FC18}" type="datetimeFigureOut">
               <a:rPr lang="en-GB" smtClean="0"/>
-              <a:t>13/03/2015</a:t>
+              <a:t>22/04/2015</a:t>
             </a:fld>
             <a:endParaRPr lang="en-GB" dirty="0"/>
           </a:p>
@@ -808,7 +809,7 @@
           <a:p>
             <a:fld id="{FB5C35D8-3231-4754-9AE7-6DBAFD39FC18}" type="datetimeFigureOut">
               <a:rPr lang="en-GB" smtClean="0"/>
-              <a:t>13/03/2015</a:t>
+              <a:t>22/04/2015</a:t>
             </a:fld>
             <a:endParaRPr lang="en-GB" dirty="0"/>
           </a:p>
@@ -1054,7 +1055,7 @@
           <a:p>
             <a:fld id="{FB5C35D8-3231-4754-9AE7-6DBAFD39FC18}" type="datetimeFigureOut">
               <a:rPr lang="en-GB" smtClean="0"/>
-              <a:t>13/03/2015</a:t>
+              <a:t>22/04/2015</a:t>
             </a:fld>
             <a:endParaRPr lang="en-GB" dirty="0"/>
           </a:p>
@@ -1342,7 +1343,7 @@
           <a:p>
             <a:fld id="{FB5C35D8-3231-4754-9AE7-6DBAFD39FC18}" type="datetimeFigureOut">
               <a:rPr lang="en-GB" smtClean="0"/>
-              <a:t>13/03/2015</a:t>
+              <a:t>22/04/2015</a:t>
             </a:fld>
             <a:endParaRPr lang="en-GB" dirty="0"/>
           </a:p>
@@ -1764,7 +1765,7 @@
           <a:p>
             <a:fld id="{FB5C35D8-3231-4754-9AE7-6DBAFD39FC18}" type="datetimeFigureOut">
               <a:rPr lang="en-GB" smtClean="0"/>
-              <a:t>13/03/2015</a:t>
+              <a:t>22/04/2015</a:t>
             </a:fld>
             <a:endParaRPr lang="en-GB" dirty="0"/>
           </a:p>
@@ -1882,7 +1883,7 @@
           <a:p>
             <a:fld id="{FB5C35D8-3231-4754-9AE7-6DBAFD39FC18}" type="datetimeFigureOut">
               <a:rPr lang="en-GB" smtClean="0"/>
-              <a:t>13/03/2015</a:t>
+              <a:t>22/04/2015</a:t>
             </a:fld>
             <a:endParaRPr lang="en-GB" dirty="0"/>
           </a:p>
@@ -1977,7 +1978,7 @@
           <a:p>
             <a:fld id="{FB5C35D8-3231-4754-9AE7-6DBAFD39FC18}" type="datetimeFigureOut">
               <a:rPr lang="en-GB" smtClean="0"/>
-              <a:t>13/03/2015</a:t>
+              <a:t>22/04/2015</a:t>
             </a:fld>
             <a:endParaRPr lang="en-GB" dirty="0"/>
           </a:p>
@@ -2254,7 +2255,7 @@
           <a:p>
             <a:fld id="{FB5C35D8-3231-4754-9AE7-6DBAFD39FC18}" type="datetimeFigureOut">
               <a:rPr lang="en-GB" smtClean="0"/>
-              <a:t>13/03/2015</a:t>
+              <a:t>22/04/2015</a:t>
             </a:fld>
             <a:endParaRPr lang="en-GB" dirty="0"/>
           </a:p>
@@ -2507,7 +2508,7 @@
           <a:p>
             <a:fld id="{FB5C35D8-3231-4754-9AE7-6DBAFD39FC18}" type="datetimeFigureOut">
               <a:rPr lang="en-GB" smtClean="0"/>
-              <a:t>13/03/2015</a:t>
+              <a:t>22/04/2015</a:t>
             </a:fld>
             <a:endParaRPr lang="en-GB" dirty="0"/>
           </a:p>
@@ -2720,7 +2721,7 @@
           <a:p>
             <a:fld id="{FB5C35D8-3231-4754-9AE7-6DBAFD39FC18}" type="datetimeFigureOut">
               <a:rPr lang="en-GB" smtClean="0"/>
-              <a:t>13/03/2015</a:t>
+              <a:t>22/04/2015</a:t>
             </a:fld>
             <a:endParaRPr lang="en-GB" dirty="0"/>
           </a:p>
@@ -3253,194 +3254,445 @@
           </a:p>
         </p:txBody>
       </p:sp>
-      <p:sp>
-        <p:nvSpPr>
-          <p:cNvPr id="7" name="TextBox 6"/>
-          <p:cNvSpPr txBox="1"/>
+      <p:grpSp>
+        <p:nvGrpSpPr>
+          <p:cNvPr id="2" name="Group 1"/>
+          <p:cNvGrpSpPr/>
           <p:nvPr/>
-        </p:nvSpPr>
-        <p:spPr>
+        </p:nvGrpSpPr>
+        <p:grpSpPr>
           <a:xfrm>
-            <a:off x="1268178" y="3310806"/>
-            <a:ext cx="1144150" cy="821182"/>
+            <a:off x="1242540" y="3310806"/>
+            <a:ext cx="1169788" cy="1702370"/>
+            <a:chOff x="1242540" y="3310806"/>
+            <a:chExt cx="1169788" cy="1702370"/>
           </a:xfrm>
-          <a:prstGeom prst="rect">
-            <a:avLst/>
-          </a:prstGeom>
-          <a:noFill/>
-        </p:spPr>
-        <p:txBody>
-          <a:bodyPr wrap="none" lIns="72000" tIns="36000" rtlCol="0">
-            <a:spAutoFit/>
-          </a:bodyPr>
-          <a:lstStyle/>
-          <a:p>
-            <a:r>
-              <a:rPr lang="en-GB" sz="4800" spc="110" dirty="0">
-                <a:solidFill>
-                  <a:schemeClr val="accent6"/>
-                </a:solidFill>
-                <a:latin typeface="Britannic Bold" panose="020B0903060703020204" pitchFamily="34" charset="0"/>
-                <a:cs typeface="Aharoni" panose="02010803020104030203" pitchFamily="2" charset="-79"/>
-              </a:rPr>
-              <a:t>i</a:t>
-            </a:r>
-            <a:r>
-              <a:rPr lang="en-GB" sz="4800" spc="110" dirty="0" smtClean="0">
-                <a:solidFill>
-                  <a:schemeClr val="accent6"/>
-                </a:solidFill>
-                <a:latin typeface="Britannic Bold" panose="020B0903060703020204" pitchFamily="34" charset="0"/>
-                <a:cs typeface="Aharoni" panose="02010803020104030203" pitchFamily="2" charset="-79"/>
-              </a:rPr>
-              <a:t>sis</a:t>
-            </a:r>
-            <a:endParaRPr lang="en-GB" sz="4800" spc="110" dirty="0">
-              <a:solidFill>
-                <a:schemeClr val="accent3"/>
-              </a:solidFill>
-              <a:latin typeface="Britannic Bold" panose="020B0903060703020204" pitchFamily="34" charset="0"/>
-              <a:cs typeface="Aharoni" panose="02010803020104030203" pitchFamily="2" charset="-79"/>
-            </a:endParaRPr>
-          </a:p>
-        </p:txBody>
-      </p:sp>
-      <p:sp>
-        <p:nvSpPr>
-          <p:cNvPr id="8" name="TextBox 7"/>
-          <p:cNvSpPr txBox="1"/>
-          <p:nvPr/>
-        </p:nvSpPr>
-        <p:spPr>
-          <a:xfrm>
-            <a:off x="1251086" y="3777038"/>
-            <a:ext cx="1154089" cy="821182"/>
-          </a:xfrm>
-          <a:prstGeom prst="rect">
-            <a:avLst/>
-          </a:prstGeom>
-          <a:noFill/>
-        </p:spPr>
-        <p:txBody>
-          <a:bodyPr wrap="none" lIns="72000" tIns="36000" rtlCol="0">
-            <a:spAutoFit/>
-          </a:bodyPr>
-          <a:lstStyle/>
-          <a:p>
-            <a:r>
-              <a:rPr lang="en-GB" sz="4800" dirty="0" smtClean="0">
-                <a:solidFill>
-                  <a:schemeClr val="accent1"/>
-                </a:solidFill>
-                <a:latin typeface="Britannic Bold" panose="020B0903060703020204" pitchFamily="34" charset="0"/>
-                <a:cs typeface="Aharoni" panose="02010803020104030203" pitchFamily="2" charset="-79"/>
-              </a:rPr>
-              <a:t>add</a:t>
-            </a:r>
-            <a:endParaRPr lang="en-GB" sz="4800" dirty="0">
-              <a:solidFill>
-                <a:schemeClr val="accent3"/>
-              </a:solidFill>
-              <a:latin typeface="Britannic Bold" panose="020B0903060703020204" pitchFamily="34" charset="0"/>
-              <a:cs typeface="Aharoni" panose="02010803020104030203" pitchFamily="2" charset="-79"/>
-            </a:endParaRPr>
-          </a:p>
-        </p:txBody>
-      </p:sp>
-      <p:sp>
-        <p:nvSpPr>
-          <p:cNvPr id="9" name="TextBox 8"/>
-          <p:cNvSpPr txBox="1"/>
-          <p:nvPr/>
-        </p:nvSpPr>
-        <p:spPr>
-          <a:xfrm>
-            <a:off x="1242540" y="4191994"/>
-            <a:ext cx="1166592" cy="821182"/>
-          </a:xfrm>
-          <a:prstGeom prst="rect">
-            <a:avLst/>
-          </a:prstGeom>
-          <a:noFill/>
-        </p:spPr>
-        <p:txBody>
-          <a:bodyPr wrap="none" lIns="72000" tIns="36000" rtlCol="0">
-            <a:spAutoFit/>
-          </a:bodyPr>
-          <a:lstStyle/>
-          <a:p>
-            <a:r>
-              <a:rPr lang="en-GB" sz="4800" spc="70" dirty="0" smtClean="0">
+        </p:grpSpPr>
+        <p:sp>
+          <p:nvSpPr>
+            <p:cNvPr id="7" name="TextBox 6"/>
+            <p:cNvSpPr txBox="1"/>
+            <p:nvPr/>
+          </p:nvSpPr>
+          <p:spPr>
+            <a:xfrm>
+              <a:off x="1268178" y="3310806"/>
+              <a:ext cx="1144150" cy="821182"/>
+            </a:xfrm>
+            <a:prstGeom prst="rect">
+              <a:avLst/>
+            </a:prstGeom>
+            <a:noFill/>
+          </p:spPr>
+          <p:txBody>
+            <a:bodyPr wrap="none" lIns="72000" tIns="36000" rtlCol="0">
+              <a:spAutoFit/>
+            </a:bodyPr>
+            <a:lstStyle/>
+            <a:p>
+              <a:r>
+                <a:rPr lang="en-GB" sz="4800" spc="110" dirty="0">
+                  <a:solidFill>
+                    <a:schemeClr val="accent6"/>
+                  </a:solidFill>
+                  <a:latin typeface="Britannic Bold" panose="020B0903060703020204" pitchFamily="34" charset="0"/>
+                  <a:cs typeface="Aharoni" panose="02010803020104030203" pitchFamily="2" charset="-79"/>
+                </a:rPr>
+                <a:t>i</a:t>
+              </a:r>
+              <a:r>
+                <a:rPr lang="en-GB" sz="4800" spc="110" dirty="0" smtClean="0">
+                  <a:solidFill>
+                    <a:schemeClr val="accent6"/>
+                  </a:solidFill>
+                  <a:latin typeface="Britannic Bold" panose="020B0903060703020204" pitchFamily="34" charset="0"/>
+                  <a:cs typeface="Aharoni" panose="02010803020104030203" pitchFamily="2" charset="-79"/>
+                </a:rPr>
+                <a:t>sis</a:t>
+              </a:r>
+              <a:endParaRPr lang="en-GB" sz="4800" spc="110" dirty="0">
                 <a:solidFill>
                   <a:schemeClr val="accent3"/>
                 </a:solidFill>
                 <a:latin typeface="Britannic Bold" panose="020B0903060703020204" pitchFamily="34" charset="0"/>
                 <a:cs typeface="Aharoni" panose="02010803020104030203" pitchFamily="2" charset="-79"/>
-              </a:rPr>
-              <a:t>ons</a:t>
-            </a:r>
-            <a:endParaRPr lang="en-GB" sz="4800" spc="70" dirty="0">
-              <a:solidFill>
-                <a:schemeClr val="accent3"/>
-              </a:solidFill>
-              <a:latin typeface="Britannic Bold" panose="020B0903060703020204" pitchFamily="34" charset="0"/>
-              <a:cs typeface="Aharoni" panose="02010803020104030203" pitchFamily="2" charset="-79"/>
-            </a:endParaRPr>
-          </a:p>
-        </p:txBody>
-      </p:sp>
-      <p:sp>
-        <p:nvSpPr>
-          <p:cNvPr id="11" name="Rectangle 10"/>
-          <p:cNvSpPr/>
-          <p:nvPr/>
-        </p:nvSpPr>
-        <p:spPr>
-          <a:xfrm rot="16200000">
-            <a:off x="1726732" y="4141079"/>
-            <a:ext cx="1296143" cy="45719"/>
-          </a:xfrm>
-          <a:prstGeom prst="rect">
-            <a:avLst/>
-          </a:prstGeom>
-          <a:solidFill>
-            <a:schemeClr val="accent2"/>
-          </a:solidFill>
-          <a:ln>
+              </a:endParaRPr>
+            </a:p>
+          </p:txBody>
+        </p:sp>
+        <p:sp>
+          <p:nvSpPr>
+            <p:cNvPr id="8" name="TextBox 7"/>
+            <p:cNvSpPr txBox="1"/>
+            <p:nvPr/>
+          </p:nvSpPr>
+          <p:spPr>
+            <a:xfrm>
+              <a:off x="1251086" y="3777038"/>
+              <a:ext cx="1154089" cy="821182"/>
+            </a:xfrm>
+            <a:prstGeom prst="rect">
+              <a:avLst/>
+            </a:prstGeom>
+            <a:noFill/>
+          </p:spPr>
+          <p:txBody>
+            <a:bodyPr wrap="none" lIns="72000" tIns="36000" rtlCol="0">
+              <a:spAutoFit/>
+            </a:bodyPr>
+            <a:lstStyle/>
+            <a:p>
+              <a:r>
+                <a:rPr lang="en-GB" sz="4800" dirty="0" smtClean="0">
+                  <a:solidFill>
+                    <a:schemeClr val="accent1"/>
+                  </a:solidFill>
+                  <a:latin typeface="Britannic Bold" panose="020B0903060703020204" pitchFamily="34" charset="0"/>
+                  <a:cs typeface="Aharoni" panose="02010803020104030203" pitchFamily="2" charset="-79"/>
+                </a:rPr>
+                <a:t>add</a:t>
+              </a:r>
+              <a:endParaRPr lang="en-GB" sz="4800" dirty="0">
+                <a:solidFill>
+                  <a:schemeClr val="accent3"/>
+                </a:solidFill>
+                <a:latin typeface="Britannic Bold" panose="020B0903060703020204" pitchFamily="34" charset="0"/>
+                <a:cs typeface="Aharoni" panose="02010803020104030203" pitchFamily="2" charset="-79"/>
+              </a:endParaRPr>
+            </a:p>
+          </p:txBody>
+        </p:sp>
+        <p:sp>
+          <p:nvSpPr>
+            <p:cNvPr id="9" name="TextBox 8"/>
+            <p:cNvSpPr txBox="1"/>
+            <p:nvPr/>
+          </p:nvSpPr>
+          <p:spPr>
+            <a:xfrm>
+              <a:off x="1242540" y="4191994"/>
+              <a:ext cx="1166592" cy="821182"/>
+            </a:xfrm>
+            <a:prstGeom prst="rect">
+              <a:avLst/>
+            </a:prstGeom>
+            <a:noFill/>
+          </p:spPr>
+          <p:txBody>
+            <a:bodyPr wrap="none" lIns="72000" tIns="36000" rtlCol="0">
+              <a:spAutoFit/>
+            </a:bodyPr>
+            <a:lstStyle/>
+            <a:p>
+              <a:r>
+                <a:rPr lang="en-GB" sz="4800" spc="70" dirty="0" smtClean="0">
+                  <a:solidFill>
+                    <a:schemeClr val="accent3"/>
+                  </a:solidFill>
+                  <a:latin typeface="Britannic Bold" panose="020B0903060703020204" pitchFamily="34" charset="0"/>
+                  <a:cs typeface="Aharoni" panose="02010803020104030203" pitchFamily="2" charset="-79"/>
+                </a:rPr>
+                <a:t>ons</a:t>
+              </a:r>
+              <a:endParaRPr lang="en-GB" sz="4800" spc="70" dirty="0">
+                <a:solidFill>
+                  <a:schemeClr val="accent3"/>
+                </a:solidFill>
+                <a:latin typeface="Britannic Bold" panose="020B0903060703020204" pitchFamily="34" charset="0"/>
+                <a:cs typeface="Aharoni" panose="02010803020104030203" pitchFamily="2" charset="-79"/>
+              </a:endParaRPr>
+            </a:p>
+          </p:txBody>
+        </p:sp>
+        <p:sp>
+          <p:nvSpPr>
+            <p:cNvPr id="11" name="Rectangle 10"/>
+            <p:cNvSpPr/>
+            <p:nvPr/>
+          </p:nvSpPr>
+          <p:spPr>
+            <a:xfrm rot="16200000">
+              <a:off x="1726732" y="4141079"/>
+              <a:ext cx="1296143" cy="45719"/>
+            </a:xfrm>
+            <a:prstGeom prst="rect">
+              <a:avLst/>
+            </a:prstGeom>
             <a:solidFill>
               <a:schemeClr val="accent2"/>
             </a:solidFill>
-          </a:ln>
-        </p:spPr>
-        <p:style>
-          <a:lnRef idx="2">
-            <a:schemeClr val="accent1">
-              <a:shade val="50000"/>
-            </a:schemeClr>
-          </a:lnRef>
-          <a:fillRef idx="1">
-            <a:schemeClr val="accent1"/>
-          </a:fillRef>
-          <a:effectRef idx="0">
-            <a:schemeClr val="accent1"/>
-          </a:effectRef>
-          <a:fontRef idx="minor">
-            <a:schemeClr val="lt1"/>
-          </a:fontRef>
-        </p:style>
-        <p:txBody>
-          <a:bodyPr rtlCol="0" anchor="ctr"/>
-          <a:lstStyle/>
-          <a:p>
-            <a:pPr algn="ctr"/>
-            <a:endParaRPr lang="en-GB" dirty="0"/>
-          </a:p>
-        </p:txBody>
-      </p:sp>
+            <a:ln>
+              <a:solidFill>
+                <a:schemeClr val="accent2"/>
+              </a:solidFill>
+            </a:ln>
+          </p:spPr>
+          <p:style>
+            <a:lnRef idx="2">
+              <a:schemeClr val="accent1">
+                <a:shade val="50000"/>
+              </a:schemeClr>
+            </a:lnRef>
+            <a:fillRef idx="1">
+              <a:schemeClr val="accent1"/>
+            </a:fillRef>
+            <a:effectRef idx="0">
+              <a:schemeClr val="accent1"/>
+            </a:effectRef>
+            <a:fontRef idx="minor">
+              <a:schemeClr val="lt1"/>
+            </a:fontRef>
+          </p:style>
+          <p:txBody>
+            <a:bodyPr rtlCol="0" anchor="ctr"/>
+            <a:lstStyle/>
+            <a:p>
+              <a:pPr algn="ctr"/>
+              <a:endParaRPr lang="en-GB" dirty="0"/>
+            </a:p>
+          </p:txBody>
+        </p:sp>
+      </p:grpSp>
     </p:spTree>
     <p:extLst>
       <p:ext uri="{BB962C8B-B14F-4D97-AF65-F5344CB8AC3E}">
         <p14:creationId xmlns:p14="http://schemas.microsoft.com/office/powerpoint/2010/main" val="179400239"/>
+      </p:ext>
+    </p:extLst>
+  </p:cSld>
+  <p:clrMapOvr>
+    <a:masterClrMapping/>
+  </p:clrMapOvr>
+  <p:timing>
+    <p:tnLst>
+      <p:par>
+        <p:cTn id="1" dur="indefinite" restart="never" nodeType="tmRoot"/>
+      </p:par>
+    </p:tnLst>
+  </p:timing>
+</p:sld>
+</file>
+
+<file path=ppt/slides/slide2.xml><?xml version="1.0" encoding="utf-8"?>
+<p:sld xmlns:a="http://schemas.openxmlformats.org/drawingml/2006/main" xmlns:r="http://schemas.openxmlformats.org/officeDocument/2006/relationships" xmlns:p="http://schemas.openxmlformats.org/presentationml/2006/main">
+  <p:cSld>
+    <p:spTree>
+      <p:nvGrpSpPr>
+        <p:cNvPr id="1" name=""/>
+        <p:cNvGrpSpPr/>
+        <p:nvPr/>
+      </p:nvGrpSpPr>
+      <p:grpSpPr>
+        <a:xfrm>
+          <a:off x="0" y="0"/>
+          <a:ext cx="0" cy="0"/>
+          <a:chOff x="0" y="0"/>
+          <a:chExt cx="0" cy="0"/>
+        </a:xfrm>
+      </p:grpSpPr>
+      <p:grpSp>
+        <p:nvGrpSpPr>
+          <p:cNvPr id="3" name="Group 2"/>
+          <p:cNvGrpSpPr/>
+          <p:nvPr/>
+        </p:nvGrpSpPr>
+        <p:grpSpPr>
+          <a:xfrm>
+            <a:off x="1242536" y="556300"/>
+            <a:ext cx="3257454" cy="4750807"/>
+            <a:chOff x="1242540" y="3310806"/>
+            <a:chExt cx="750968" cy="1645171"/>
+          </a:xfrm>
+        </p:grpSpPr>
+        <p:sp>
+          <p:nvSpPr>
+            <p:cNvPr id="4" name="TextBox 3"/>
+            <p:cNvSpPr txBox="1"/>
+            <p:nvPr/>
+          </p:nvSpPr>
+          <p:spPr>
+            <a:xfrm>
+              <a:off x="1268178" y="3310806"/>
+              <a:ext cx="669688" cy="763983"/>
+            </a:xfrm>
+            <a:prstGeom prst="rect">
+              <a:avLst/>
+            </a:prstGeom>
+            <a:noFill/>
+          </p:spPr>
+          <p:txBody>
+            <a:bodyPr wrap="none" lIns="72000" tIns="36000" rtlCol="0">
+              <a:spAutoFit/>
+            </a:bodyPr>
+            <a:lstStyle/>
+            <a:p>
+              <a:r>
+                <a:rPr lang="en-GB" sz="13800" spc="110" dirty="0">
+                  <a:solidFill>
+                    <a:schemeClr val="accent6"/>
+                  </a:solidFill>
+                  <a:latin typeface="Britannic Bold" panose="020B0903060703020204" pitchFamily="34" charset="0"/>
+                  <a:cs typeface="Aharoni" panose="02010803020104030203" pitchFamily="2" charset="-79"/>
+                </a:rPr>
+                <a:t>i</a:t>
+              </a:r>
+              <a:r>
+                <a:rPr lang="en-GB" sz="13800" spc="110" dirty="0" smtClean="0">
+                  <a:solidFill>
+                    <a:schemeClr val="accent6"/>
+                  </a:solidFill>
+                  <a:latin typeface="Britannic Bold" panose="020B0903060703020204" pitchFamily="34" charset="0"/>
+                  <a:cs typeface="Aharoni" panose="02010803020104030203" pitchFamily="2" charset="-79"/>
+                </a:rPr>
+                <a:t>sis</a:t>
+              </a:r>
+              <a:endParaRPr lang="en-GB" sz="13800" spc="110" dirty="0">
+                <a:solidFill>
+                  <a:schemeClr val="accent3"/>
+                </a:solidFill>
+                <a:latin typeface="Britannic Bold" panose="020B0903060703020204" pitchFamily="34" charset="0"/>
+                <a:cs typeface="Aharoni" panose="02010803020104030203" pitchFamily="2" charset="-79"/>
+              </a:endParaRPr>
+            </a:p>
+          </p:txBody>
+        </p:sp>
+        <p:sp>
+          <p:nvSpPr>
+            <p:cNvPr id="5" name="TextBox 4"/>
+            <p:cNvSpPr txBox="1"/>
+            <p:nvPr/>
+          </p:nvSpPr>
+          <p:spPr>
+            <a:xfrm>
+              <a:off x="1251086" y="3777038"/>
+              <a:ext cx="693635" cy="763983"/>
+            </a:xfrm>
+            <a:prstGeom prst="rect">
+              <a:avLst/>
+            </a:prstGeom>
+            <a:noFill/>
+          </p:spPr>
+          <p:txBody>
+            <a:bodyPr wrap="none" lIns="72000" tIns="36000" rtlCol="0">
+              <a:spAutoFit/>
+            </a:bodyPr>
+            <a:lstStyle/>
+            <a:p>
+              <a:r>
+                <a:rPr lang="en-GB" sz="13800" dirty="0" smtClean="0">
+                  <a:solidFill>
+                    <a:schemeClr val="accent1"/>
+                  </a:solidFill>
+                  <a:latin typeface="Britannic Bold" panose="020B0903060703020204" pitchFamily="34" charset="0"/>
+                  <a:cs typeface="Aharoni" panose="02010803020104030203" pitchFamily="2" charset="-79"/>
+                </a:rPr>
+                <a:t>add</a:t>
+              </a:r>
+              <a:endParaRPr lang="en-GB" sz="13800" dirty="0">
+                <a:solidFill>
+                  <a:schemeClr val="accent3"/>
+                </a:solidFill>
+                <a:latin typeface="Britannic Bold" panose="020B0903060703020204" pitchFamily="34" charset="0"/>
+                <a:cs typeface="Aharoni" panose="02010803020104030203" pitchFamily="2" charset="-79"/>
+              </a:endParaRPr>
+            </a:p>
+          </p:txBody>
+        </p:sp>
+        <p:sp>
+          <p:nvSpPr>
+            <p:cNvPr id="6" name="TextBox 5"/>
+            <p:cNvSpPr txBox="1"/>
+            <p:nvPr/>
+          </p:nvSpPr>
+          <p:spPr>
+            <a:xfrm>
+              <a:off x="1242540" y="4191994"/>
+              <a:ext cx="690235" cy="763983"/>
+            </a:xfrm>
+            <a:prstGeom prst="rect">
+              <a:avLst/>
+            </a:prstGeom>
+            <a:noFill/>
+          </p:spPr>
+          <p:txBody>
+            <a:bodyPr wrap="none" lIns="72000" tIns="36000" rtlCol="0">
+              <a:spAutoFit/>
+            </a:bodyPr>
+            <a:lstStyle/>
+            <a:p>
+              <a:r>
+                <a:rPr lang="en-GB" sz="13800" spc="70" dirty="0" smtClean="0">
+                  <a:solidFill>
+                    <a:schemeClr val="accent3"/>
+                  </a:solidFill>
+                  <a:latin typeface="Britannic Bold" panose="020B0903060703020204" pitchFamily="34" charset="0"/>
+                  <a:cs typeface="Aharoni" panose="02010803020104030203" pitchFamily="2" charset="-79"/>
+                </a:rPr>
+                <a:t>ons</a:t>
+              </a:r>
+              <a:endParaRPr lang="en-GB" sz="13800" spc="70" dirty="0">
+                <a:solidFill>
+                  <a:schemeClr val="accent3"/>
+                </a:solidFill>
+                <a:latin typeface="Britannic Bold" panose="020B0903060703020204" pitchFamily="34" charset="0"/>
+                <a:cs typeface="Aharoni" panose="02010803020104030203" pitchFamily="2" charset="-79"/>
+              </a:endParaRPr>
+            </a:p>
+          </p:txBody>
+        </p:sp>
+        <p:sp>
+          <p:nvSpPr>
+            <p:cNvPr id="7" name="Rectangle 6"/>
+            <p:cNvSpPr/>
+            <p:nvPr/>
+          </p:nvSpPr>
+          <p:spPr>
+            <a:xfrm rot="16200000">
+              <a:off x="1322577" y="4126925"/>
+              <a:ext cx="1296143" cy="45719"/>
+            </a:xfrm>
+            <a:prstGeom prst="rect">
+              <a:avLst/>
+            </a:prstGeom>
+            <a:solidFill>
+              <a:schemeClr val="accent2"/>
+            </a:solidFill>
+            <a:ln>
+              <a:solidFill>
+                <a:schemeClr val="accent2"/>
+              </a:solidFill>
+            </a:ln>
+          </p:spPr>
+          <p:style>
+            <a:lnRef idx="2">
+              <a:schemeClr val="accent1">
+                <a:shade val="50000"/>
+              </a:schemeClr>
+            </a:lnRef>
+            <a:fillRef idx="1">
+              <a:schemeClr val="accent1"/>
+            </a:fillRef>
+            <a:effectRef idx="0">
+              <a:schemeClr val="accent1"/>
+            </a:effectRef>
+            <a:fontRef idx="minor">
+              <a:schemeClr val="lt1"/>
+            </a:fontRef>
+          </p:style>
+          <p:txBody>
+            <a:bodyPr rtlCol="0" anchor="ctr"/>
+            <a:lstStyle/>
+            <a:p>
+              <a:pPr algn="ctr"/>
+              <a:endParaRPr lang="en-GB" sz="5400" dirty="0"/>
+            </a:p>
+          </p:txBody>
+        </p:sp>
+      </p:grpSp>
+    </p:spTree>
+    <p:extLst>
+      <p:ext uri="{BB962C8B-B14F-4D97-AF65-F5344CB8AC3E}">
+        <p14:creationId xmlns:p14="http://schemas.microsoft.com/office/powerpoint/2010/main" val="721412367"/>
       </p:ext>
     </p:extLst>
   </p:cSld>

</xml_diff>